<commit_message>
make hml, css, js
</commit_message>
<xml_diff>
--- a/study-note/자바/2022-09-19 내용정리.pptx
+++ b/study-note/자바/2022-09-19 내용정리.pptx
@@ -6521,12 +6521,8 @@
           <a:p>
             <a:pPr algn="ctr"/>
             <a:r>
-              <a:rPr kumimoji="1" lang="ko-KR" altLang="en-US" sz="1200"/>
-              <a:t>내가 </a:t>
-            </a:r>
-            <a:r>
               <a:rPr kumimoji="1" lang="ko-KR" altLang="en-US" sz="1200" dirty="0"/>
-              <a:t>만든 규칙</a:t>
+              <a:t>내가 만든 규칙</a:t>
             </a:r>
             <a:endParaRPr kumimoji="1" lang="ko-Kore-KR" altLang="en-US" sz="1200" dirty="0"/>
           </a:p>
@@ -6622,6 +6618,113 @@
             <a:r>
               <a:rPr kumimoji="1" lang="ko-KR" altLang="en-US" sz="1200" dirty="0"/>
               <a:t>가 만든 규칙</a:t>
+            </a:r>
+            <a:endParaRPr kumimoji="1" lang="ko-Kore-KR" altLang="en-US" sz="1200" dirty="0"/>
+          </a:p>
+        </p:txBody>
+      </p:sp>
+      <p:sp>
+        <p:nvSpPr>
+          <p:cNvPr id="74" name="직사각형 73">
+            <a:extLst>
+              <a:ext uri="{FF2B5EF4-FFF2-40B4-BE49-F238E27FC236}">
+                <a16:creationId xmlns:a16="http://schemas.microsoft.com/office/drawing/2014/main" id="{71CABAE7-1BC8-C629-919D-99ABC831741D}"/>
+              </a:ext>
+            </a:extLst>
+          </p:cNvPr>
+          <p:cNvSpPr/>
+          <p:nvPr/>
+        </p:nvSpPr>
+        <p:spPr>
+          <a:xfrm>
+            <a:off x="2406541" y="3490532"/>
+            <a:ext cx="6968358" cy="2000467"/>
+          </a:xfrm>
+          <a:prstGeom prst="rect">
+            <a:avLst/>
+          </a:prstGeom>
+          <a:noFill/>
+          <a:ln w="41275">
+            <a:solidFill>
+              <a:srgbClr val="C43EA7"/>
+            </a:solidFill>
+          </a:ln>
+        </p:spPr>
+        <p:style>
+          <a:lnRef idx="2">
+            <a:schemeClr val="accent1"/>
+          </a:lnRef>
+          <a:fillRef idx="1">
+            <a:schemeClr val="lt1"/>
+          </a:fillRef>
+          <a:effectRef idx="0">
+            <a:schemeClr val="accent1"/>
+          </a:effectRef>
+          <a:fontRef idx="minor">
+            <a:schemeClr val="dk1"/>
+          </a:fontRef>
+        </p:style>
+        <p:txBody>
+          <a:bodyPr rtlCol="0" anchor="ctr"/>
+          <a:lstStyle/>
+          <a:p>
+            <a:pPr algn="ctr"/>
+            <a:endParaRPr kumimoji="1" lang="ko-Kore-KR" altLang="en-US"/>
+          </a:p>
+        </p:txBody>
+      </p:sp>
+      <p:sp>
+        <p:nvSpPr>
+          <p:cNvPr id="75" name="직사각형 74">
+            <a:extLst>
+              <a:ext uri="{FF2B5EF4-FFF2-40B4-BE49-F238E27FC236}">
+                <a16:creationId xmlns:a16="http://schemas.microsoft.com/office/drawing/2014/main" id="{F70B11D0-DE4F-9BB2-B48C-DC73A3E22D97}"/>
+              </a:ext>
+            </a:extLst>
+          </p:cNvPr>
+          <p:cNvSpPr/>
+          <p:nvPr/>
+        </p:nvSpPr>
+        <p:spPr>
+          <a:xfrm>
+            <a:off x="6896647" y="5330721"/>
+            <a:ext cx="1373462" cy="285529"/>
+          </a:xfrm>
+          <a:prstGeom prst="rect">
+            <a:avLst/>
+          </a:prstGeom>
+          <a:ln>
+            <a:solidFill>
+              <a:srgbClr val="C43EA7"/>
+            </a:solidFill>
+          </a:ln>
+        </p:spPr>
+        <p:style>
+          <a:lnRef idx="2">
+            <a:schemeClr val="accent1"/>
+          </a:lnRef>
+          <a:fillRef idx="1">
+            <a:schemeClr val="lt1"/>
+          </a:fillRef>
+          <a:effectRef idx="0">
+            <a:schemeClr val="accent1"/>
+          </a:effectRef>
+          <a:fontRef idx="minor">
+            <a:schemeClr val="dk1"/>
+          </a:fontRef>
+        </p:style>
+        <p:txBody>
+          <a:bodyPr rtlCol="0" anchor="ctr"/>
+          <a:lstStyle/>
+          <a:p>
+            <a:pPr algn="ctr"/>
+            <a:r>
+              <a:rPr kumimoji="1" lang="en-US" altLang="ko-Kore-KR" sz="1200"/>
+              <a:t>Tomcat </a:t>
+            </a:r>
+            <a:r>
+              <a:rPr kumimoji="1" lang="en-US" altLang="ko-Kore-KR" sz="1200" dirty="0"/>
+              <a:t>Server</a:t>
             </a:r>
             <a:endParaRPr kumimoji="1" lang="ko-Kore-KR" altLang="en-US" sz="1200" dirty="0"/>
           </a:p>

</xml_diff>